<commit_message>
Adding network layer figure
Adding network layer figure
</commit_message>
<xml_diff>
--- a/Middleware/Microservice.pptx
+++ b/Middleware/Microservice.pptx
@@ -7,6 +7,7 @@
   <p:sldIdLst>
     <p:sldId id="256" r:id="rId2"/>
     <p:sldId id="257" r:id="rId3"/>
+    <p:sldId id="258" r:id="rId4"/>
   </p:sldIdLst>
   <p:sldSz cx="12192000" cy="6858000"/>
   <p:notesSz cx="6858000" cy="9144000"/>
@@ -105,6 +106,11 @@
       </a:defRPr>
     </a:lvl9pPr>
   </p:defaultTextStyle>
+  <p:extLst>
+    <p:ext uri="{EFAFB233-063F-42B5-8137-9DF3F51BA10A}">
+      <p15:sldGuideLst xmlns:p15="http://schemas.microsoft.com/office/powerpoint/2012/main"/>
+    </p:ext>
+  </p:extLst>
 </p:presentation>
 </file>
 
@@ -257,7 +263,7 @@
           <a:p>
             <a:fld id="{236C1276-7BD6-4E18-BC70-59DD46979110}" type="datetimeFigureOut">
               <a:rPr lang="en-GB" smtClean="0"/>
-              <a:t>18/02/2022</a:t>
+              <a:t>31/03/2022</a:t>
             </a:fld>
             <a:endParaRPr lang="en-GB"/>
           </a:p>
@@ -457,7 +463,7 @@
           <a:p>
             <a:fld id="{236C1276-7BD6-4E18-BC70-59DD46979110}" type="datetimeFigureOut">
               <a:rPr lang="en-GB" smtClean="0"/>
-              <a:t>18/02/2022</a:t>
+              <a:t>31/03/2022</a:t>
             </a:fld>
             <a:endParaRPr lang="en-GB"/>
           </a:p>
@@ -667,7 +673,7 @@
           <a:p>
             <a:fld id="{236C1276-7BD6-4E18-BC70-59DD46979110}" type="datetimeFigureOut">
               <a:rPr lang="en-GB" smtClean="0"/>
-              <a:t>18/02/2022</a:t>
+              <a:t>31/03/2022</a:t>
             </a:fld>
             <a:endParaRPr lang="en-GB"/>
           </a:p>
@@ -867,7 +873,7 @@
           <a:p>
             <a:fld id="{236C1276-7BD6-4E18-BC70-59DD46979110}" type="datetimeFigureOut">
               <a:rPr lang="en-GB" smtClean="0"/>
-              <a:t>18/02/2022</a:t>
+              <a:t>31/03/2022</a:t>
             </a:fld>
             <a:endParaRPr lang="en-GB"/>
           </a:p>
@@ -1143,7 +1149,7 @@
           <a:p>
             <a:fld id="{236C1276-7BD6-4E18-BC70-59DD46979110}" type="datetimeFigureOut">
               <a:rPr lang="en-GB" smtClean="0"/>
-              <a:t>18/02/2022</a:t>
+              <a:t>31/03/2022</a:t>
             </a:fld>
             <a:endParaRPr lang="en-GB"/>
           </a:p>
@@ -1411,7 +1417,7 @@
           <a:p>
             <a:fld id="{236C1276-7BD6-4E18-BC70-59DD46979110}" type="datetimeFigureOut">
               <a:rPr lang="en-GB" smtClean="0"/>
-              <a:t>18/02/2022</a:t>
+              <a:t>31/03/2022</a:t>
             </a:fld>
             <a:endParaRPr lang="en-GB"/>
           </a:p>
@@ -1826,7 +1832,7 @@
           <a:p>
             <a:fld id="{236C1276-7BD6-4E18-BC70-59DD46979110}" type="datetimeFigureOut">
               <a:rPr lang="en-GB" smtClean="0"/>
-              <a:t>18/02/2022</a:t>
+              <a:t>31/03/2022</a:t>
             </a:fld>
             <a:endParaRPr lang="en-GB"/>
           </a:p>
@@ -1968,7 +1974,7 @@
           <a:p>
             <a:fld id="{236C1276-7BD6-4E18-BC70-59DD46979110}" type="datetimeFigureOut">
               <a:rPr lang="en-GB" smtClean="0"/>
-              <a:t>18/02/2022</a:t>
+              <a:t>31/03/2022</a:t>
             </a:fld>
             <a:endParaRPr lang="en-GB"/>
           </a:p>
@@ -2081,7 +2087,7 @@
           <a:p>
             <a:fld id="{236C1276-7BD6-4E18-BC70-59DD46979110}" type="datetimeFigureOut">
               <a:rPr lang="en-GB" smtClean="0"/>
-              <a:t>18/02/2022</a:t>
+              <a:t>31/03/2022</a:t>
             </a:fld>
             <a:endParaRPr lang="en-GB"/>
           </a:p>
@@ -2394,7 +2400,7 @@
           <a:p>
             <a:fld id="{236C1276-7BD6-4E18-BC70-59DD46979110}" type="datetimeFigureOut">
               <a:rPr lang="en-GB" smtClean="0"/>
-              <a:t>18/02/2022</a:t>
+              <a:t>31/03/2022</a:t>
             </a:fld>
             <a:endParaRPr lang="en-GB"/>
           </a:p>
@@ -2683,7 +2689,7 @@
           <a:p>
             <a:fld id="{236C1276-7BD6-4E18-BC70-59DD46979110}" type="datetimeFigureOut">
               <a:rPr lang="en-GB" smtClean="0"/>
-              <a:t>18/02/2022</a:t>
+              <a:t>31/03/2022</a:t>
             </a:fld>
             <a:endParaRPr lang="en-GB"/>
           </a:p>
@@ -2926,7 +2932,7 @@
           <a:p>
             <a:fld id="{236C1276-7BD6-4E18-BC70-59DD46979110}" type="datetimeFigureOut">
               <a:rPr lang="en-GB" smtClean="0"/>
-              <a:t>18/02/2022</a:t>
+              <a:t>31/03/2022</a:t>
             </a:fld>
             <a:endParaRPr lang="en-GB"/>
           </a:p>
@@ -5007,6 +5013,1722 @@
 </p:sld>
 </file>
 
+<file path=ppt/slides/slide3.xml><?xml version="1.0" encoding="utf-8"?>
+<p:sld xmlns:a="http://schemas.openxmlformats.org/drawingml/2006/main" xmlns:r="http://schemas.openxmlformats.org/officeDocument/2006/relationships" xmlns:p="http://schemas.openxmlformats.org/presentationml/2006/main">
+  <p:cSld>
+    <p:spTree>
+      <p:nvGrpSpPr>
+        <p:cNvPr id="1" name=""/>
+        <p:cNvGrpSpPr/>
+        <p:nvPr/>
+      </p:nvGrpSpPr>
+      <p:grpSpPr>
+        <a:xfrm>
+          <a:off x="0" y="0"/>
+          <a:ext cx="0" cy="0"/>
+          <a:chOff x="0" y="0"/>
+          <a:chExt cx="0" cy="0"/>
+        </a:xfrm>
+      </p:grpSpPr>
+      <p:grpSp>
+        <p:nvGrpSpPr>
+          <p:cNvPr id="34" name="Group 33">
+            <a:extLst>
+              <a:ext uri="{FF2B5EF4-FFF2-40B4-BE49-F238E27FC236}">
+                <a16:creationId xmlns:a16="http://schemas.microsoft.com/office/drawing/2014/main" id="{C918F0B6-95D5-4C1A-96BF-B9924A82DB10}"/>
+              </a:ext>
+            </a:extLst>
+          </p:cNvPr>
+          <p:cNvGrpSpPr/>
+          <p:nvPr/>
+        </p:nvGrpSpPr>
+        <p:grpSpPr>
+          <a:xfrm>
+            <a:off x="1482085" y="1805795"/>
+            <a:ext cx="7305356" cy="2743201"/>
+            <a:chOff x="1482085" y="1805795"/>
+            <a:chExt cx="7305356" cy="2743201"/>
+          </a:xfrm>
+        </p:grpSpPr>
+        <p:sp>
+          <p:nvSpPr>
+            <p:cNvPr id="5" name="Rectangle 4">
+              <a:extLst>
+                <a:ext uri="{FF2B5EF4-FFF2-40B4-BE49-F238E27FC236}">
+                  <a16:creationId xmlns:a16="http://schemas.microsoft.com/office/drawing/2014/main" id="{F1D2951A-0218-41DD-86E0-D48098986DD9}"/>
+                </a:ext>
+              </a:extLst>
+            </p:cNvPr>
+            <p:cNvSpPr/>
+            <p:nvPr/>
+          </p:nvSpPr>
+          <p:spPr>
+            <a:xfrm>
+              <a:off x="3001992" y="1805796"/>
+              <a:ext cx="5785449" cy="914400"/>
+            </a:xfrm>
+            <a:prstGeom prst="rect">
+              <a:avLst/>
+            </a:prstGeom>
+            <a:solidFill>
+              <a:schemeClr val="accent6">
+                <a:lumMod val="60000"/>
+                <a:lumOff val="40000"/>
+              </a:schemeClr>
+            </a:solidFill>
+            <a:ln>
+              <a:noFill/>
+            </a:ln>
+          </p:spPr>
+          <p:style>
+            <a:lnRef idx="2">
+              <a:schemeClr val="accent1">
+                <a:shade val="50000"/>
+              </a:schemeClr>
+            </a:lnRef>
+            <a:fillRef idx="1">
+              <a:schemeClr val="accent1"/>
+            </a:fillRef>
+            <a:effectRef idx="0">
+              <a:schemeClr val="accent1"/>
+            </a:effectRef>
+            <a:fontRef idx="minor">
+              <a:schemeClr val="lt1"/>
+            </a:fontRef>
+          </p:style>
+          <p:txBody>
+            <a:bodyPr rtlCol="0" anchor="ctr"/>
+            <a:lstStyle/>
+            <a:p>
+              <a:pPr marL="0" marR="0" lvl="0" indent="0" algn="ctr" defTabSz="914400" rtl="0" eaLnBrk="1" fontAlgn="auto" latinLnBrk="0" hangingPunct="1">
+                <a:lnSpc>
+                  <a:spcPct val="100000"/>
+                </a:lnSpc>
+                <a:spcBef>
+                  <a:spcPts val="0"/>
+                </a:spcBef>
+                <a:spcAft>
+                  <a:spcPts val="0"/>
+                </a:spcAft>
+                <a:buClrTx/>
+                <a:buSzTx/>
+                <a:buFontTx/>
+                <a:buNone/>
+                <a:tabLst/>
+                <a:defRPr/>
+              </a:pPr>
+              <a:r>
+                <a:rPr kumimoji="0" lang="en-GB" sz="1800" b="0" i="0" u="none" strike="noStrike" kern="1200" cap="none" spc="0" normalizeH="0" baseline="0" noProof="0" dirty="0">
+                  <a:ln>
+                    <a:noFill/>
+                  </a:ln>
+                  <a:solidFill>
+                    <a:prstClr val="white"/>
+                  </a:solidFill>
+                  <a:effectLst/>
+                  <a:uLnTx/>
+                  <a:uFillTx/>
+                  <a:latin typeface="Calibri" panose="020F0502020204030204"/>
+                  <a:ea typeface="+mn-ea"/>
+                  <a:cs typeface="+mn-cs"/>
+                </a:rPr>
+                <a:t>ROS Network</a:t>
+              </a:r>
+            </a:p>
+          </p:txBody>
+        </p:sp>
+        <p:sp>
+          <p:nvSpPr>
+            <p:cNvPr id="6" name="Rectangle 5">
+              <a:extLst>
+                <a:ext uri="{FF2B5EF4-FFF2-40B4-BE49-F238E27FC236}">
+                  <a16:creationId xmlns:a16="http://schemas.microsoft.com/office/drawing/2014/main" id="{41464F65-614B-481D-9E5D-83B432209CE8}"/>
+                </a:ext>
+              </a:extLst>
+            </p:cNvPr>
+            <p:cNvSpPr/>
+            <p:nvPr/>
+          </p:nvSpPr>
+          <p:spPr>
+            <a:xfrm>
+              <a:off x="3001989" y="2720196"/>
+              <a:ext cx="5785449" cy="914400"/>
+            </a:xfrm>
+            <a:prstGeom prst="rect">
+              <a:avLst/>
+            </a:prstGeom>
+            <a:solidFill>
+              <a:schemeClr val="accent5">
+                <a:lumMod val="40000"/>
+                <a:lumOff val="60000"/>
+              </a:schemeClr>
+            </a:solidFill>
+            <a:ln>
+              <a:noFill/>
+            </a:ln>
+          </p:spPr>
+          <p:style>
+            <a:lnRef idx="2">
+              <a:schemeClr val="accent1">
+                <a:shade val="50000"/>
+              </a:schemeClr>
+            </a:lnRef>
+            <a:fillRef idx="1">
+              <a:schemeClr val="accent1"/>
+            </a:fillRef>
+            <a:effectRef idx="0">
+              <a:schemeClr val="accent1"/>
+            </a:effectRef>
+            <a:fontRef idx="minor">
+              <a:schemeClr val="lt1"/>
+            </a:fontRef>
+          </p:style>
+          <p:txBody>
+            <a:bodyPr rtlCol="0" anchor="ctr"/>
+            <a:lstStyle/>
+            <a:p>
+              <a:pPr marL="0" marR="0" lvl="0" indent="0" algn="ctr" defTabSz="914400" rtl="0" eaLnBrk="1" fontAlgn="auto" latinLnBrk="0" hangingPunct="1">
+                <a:lnSpc>
+                  <a:spcPct val="100000"/>
+                </a:lnSpc>
+                <a:spcBef>
+                  <a:spcPts val="0"/>
+                </a:spcBef>
+                <a:spcAft>
+                  <a:spcPts val="0"/>
+                </a:spcAft>
+                <a:buClrTx/>
+                <a:buSzTx/>
+                <a:buFontTx/>
+                <a:buNone/>
+                <a:tabLst/>
+                <a:defRPr/>
+              </a:pPr>
+              <a:r>
+                <a:rPr kumimoji="0" lang="en-GB" sz="1800" b="0" i="0" u="none" strike="noStrike" kern="1200" cap="none" spc="0" normalizeH="0" baseline="0" noProof="0" dirty="0">
+                  <a:ln>
+                    <a:noFill/>
+                  </a:ln>
+                  <a:solidFill>
+                    <a:prstClr val="white"/>
+                  </a:solidFill>
+                  <a:effectLst/>
+                  <a:uLnTx/>
+                  <a:uFillTx/>
+                  <a:latin typeface="Calibri" panose="020F0502020204030204"/>
+                  <a:ea typeface="+mn-ea"/>
+                  <a:cs typeface="+mn-cs"/>
+                </a:rPr>
+                <a:t>POD Communication                                    Calico Overlay </a:t>
+              </a:r>
+            </a:p>
+          </p:txBody>
+        </p:sp>
+        <p:sp>
+          <p:nvSpPr>
+            <p:cNvPr id="7" name="Rectangle 6">
+              <a:extLst>
+                <a:ext uri="{FF2B5EF4-FFF2-40B4-BE49-F238E27FC236}">
+                  <a16:creationId xmlns:a16="http://schemas.microsoft.com/office/drawing/2014/main" id="{4DD0BCB7-35F7-4CF4-BE01-61B1B6CE72D5}"/>
+                </a:ext>
+              </a:extLst>
+            </p:cNvPr>
+            <p:cNvSpPr/>
+            <p:nvPr/>
+          </p:nvSpPr>
+          <p:spPr>
+            <a:xfrm>
+              <a:off x="3001990" y="3634596"/>
+              <a:ext cx="5785449" cy="914400"/>
+            </a:xfrm>
+            <a:prstGeom prst="rect">
+              <a:avLst/>
+            </a:prstGeom>
+            <a:solidFill>
+              <a:schemeClr val="accent4">
+                <a:lumMod val="40000"/>
+                <a:lumOff val="60000"/>
+              </a:schemeClr>
+            </a:solidFill>
+            <a:ln>
+              <a:noFill/>
+            </a:ln>
+          </p:spPr>
+          <p:style>
+            <a:lnRef idx="2">
+              <a:schemeClr val="accent1">
+                <a:shade val="50000"/>
+              </a:schemeClr>
+            </a:lnRef>
+            <a:fillRef idx="1">
+              <a:schemeClr val="accent1"/>
+            </a:fillRef>
+            <a:effectRef idx="0">
+              <a:schemeClr val="accent1"/>
+            </a:effectRef>
+            <a:fontRef idx="minor">
+              <a:schemeClr val="lt1"/>
+            </a:fontRef>
+          </p:style>
+          <p:txBody>
+            <a:bodyPr rtlCol="0" anchor="ctr"/>
+            <a:lstStyle/>
+            <a:p>
+              <a:pPr marL="0" marR="0" lvl="0" indent="0" algn="ctr" defTabSz="914400" rtl="0" eaLnBrk="1" fontAlgn="auto" latinLnBrk="0" hangingPunct="1">
+                <a:lnSpc>
+                  <a:spcPct val="100000"/>
+                </a:lnSpc>
+                <a:spcBef>
+                  <a:spcPts val="0"/>
+                </a:spcBef>
+                <a:spcAft>
+                  <a:spcPts val="0"/>
+                </a:spcAft>
+                <a:buClrTx/>
+                <a:buSzTx/>
+                <a:buFontTx/>
+                <a:buNone/>
+                <a:tabLst/>
+                <a:defRPr/>
+              </a:pPr>
+              <a:r>
+                <a:rPr kumimoji="0" lang="en-GB" sz="1800" b="0" i="0" u="none" strike="noStrike" kern="1200" cap="none" spc="0" normalizeH="0" baseline="0" noProof="0" dirty="0">
+                  <a:ln>
+                    <a:noFill/>
+                  </a:ln>
+                  <a:solidFill>
+                    <a:prstClr val="white"/>
+                  </a:solidFill>
+                  <a:effectLst/>
+                  <a:uLnTx/>
+                  <a:uFillTx/>
+                  <a:latin typeface="Calibri" panose="020F0502020204030204"/>
+                  <a:ea typeface="+mn-ea"/>
+                  <a:cs typeface="+mn-cs"/>
+                </a:rPr>
+                <a:t>OSM &amp; SDN Controller</a:t>
+              </a:r>
+            </a:p>
+          </p:txBody>
+        </p:sp>
+        <p:sp>
+          <p:nvSpPr>
+            <p:cNvPr id="8" name="TextBox 7">
+              <a:extLst>
+                <a:ext uri="{FF2B5EF4-FFF2-40B4-BE49-F238E27FC236}">
+                  <a16:creationId xmlns:a16="http://schemas.microsoft.com/office/drawing/2014/main" id="{9434C5FE-4585-433F-88E4-FFA345106C59}"/>
+                </a:ext>
+              </a:extLst>
+            </p:cNvPr>
+            <p:cNvSpPr txBox="1"/>
+            <p:nvPr/>
+          </p:nvSpPr>
+          <p:spPr>
+            <a:xfrm>
+              <a:off x="1558851" y="1960540"/>
+              <a:ext cx="1569786" cy="461665"/>
+            </a:xfrm>
+            <a:prstGeom prst="rect">
+              <a:avLst/>
+            </a:prstGeom>
+            <a:noFill/>
+          </p:spPr>
+          <p:txBody>
+            <a:bodyPr wrap="square" rtlCol="0">
+              <a:spAutoFit/>
+            </a:bodyPr>
+            <a:lstStyle/>
+            <a:p>
+              <a:pPr marL="0" marR="0" lvl="0" indent="0" algn="ctr" defTabSz="914400" rtl="0" eaLnBrk="1" fontAlgn="auto" latinLnBrk="0" hangingPunct="1">
+                <a:lnSpc>
+                  <a:spcPct val="100000"/>
+                </a:lnSpc>
+                <a:spcBef>
+                  <a:spcPts val="0"/>
+                </a:spcBef>
+                <a:spcAft>
+                  <a:spcPts val="0"/>
+                </a:spcAft>
+                <a:buClrTx/>
+                <a:buSzTx/>
+                <a:buFontTx/>
+                <a:buNone/>
+                <a:tabLst/>
+                <a:defRPr/>
+              </a:pPr>
+              <a:r>
+                <a:rPr kumimoji="0" lang="en-GB" sz="1200" b="0" i="0" u="none" strike="noStrike" kern="1200" cap="none" spc="0" normalizeH="0" baseline="0" noProof="0" dirty="0">
+                  <a:ln>
+                    <a:noFill/>
+                  </a:ln>
+                  <a:solidFill>
+                    <a:prstClr val="black"/>
+                  </a:solidFill>
+                  <a:effectLst/>
+                  <a:uLnTx/>
+                  <a:uFillTx/>
+                  <a:latin typeface="Calibri" panose="020F0502020204030204"/>
+                  <a:ea typeface="+mn-ea"/>
+                  <a:cs typeface="+mn-cs"/>
+                </a:rPr>
+                <a:t>Vertical Layer Network (ROS)</a:t>
+              </a:r>
+            </a:p>
+          </p:txBody>
+        </p:sp>
+        <p:sp>
+          <p:nvSpPr>
+            <p:cNvPr id="9" name="TextBox 8">
+              <a:extLst>
+                <a:ext uri="{FF2B5EF4-FFF2-40B4-BE49-F238E27FC236}">
+                  <a16:creationId xmlns:a16="http://schemas.microsoft.com/office/drawing/2014/main" id="{B9F7891B-793D-40FC-B625-BF2442504585}"/>
+                </a:ext>
+              </a:extLst>
+            </p:cNvPr>
+            <p:cNvSpPr txBox="1"/>
+            <p:nvPr/>
+          </p:nvSpPr>
+          <p:spPr>
+            <a:xfrm>
+              <a:off x="1482085" y="2991478"/>
+              <a:ext cx="1569786" cy="461665"/>
+            </a:xfrm>
+            <a:prstGeom prst="rect">
+              <a:avLst/>
+            </a:prstGeom>
+            <a:noFill/>
+          </p:spPr>
+          <p:txBody>
+            <a:bodyPr wrap="square" rtlCol="0">
+              <a:spAutoFit/>
+            </a:bodyPr>
+            <a:lstStyle/>
+            <a:p>
+              <a:pPr marL="0" marR="0" lvl="0" indent="0" algn="ctr" defTabSz="914400" rtl="0" eaLnBrk="1" fontAlgn="auto" latinLnBrk="0" hangingPunct="1">
+                <a:lnSpc>
+                  <a:spcPct val="100000"/>
+                </a:lnSpc>
+                <a:spcBef>
+                  <a:spcPts val="0"/>
+                </a:spcBef>
+                <a:spcAft>
+                  <a:spcPts val="0"/>
+                </a:spcAft>
+                <a:buClrTx/>
+                <a:buSzTx/>
+                <a:buFontTx/>
+                <a:buNone/>
+                <a:tabLst/>
+                <a:defRPr/>
+              </a:pPr>
+              <a:r>
+                <a:rPr kumimoji="0" lang="en-GB" sz="1200" b="0" i="0" u="none" strike="noStrike" kern="1200" cap="none" spc="0" normalizeH="0" baseline="0" noProof="0" dirty="0">
+                  <a:ln>
+                    <a:noFill/>
+                  </a:ln>
+                  <a:solidFill>
+                    <a:prstClr val="black"/>
+                  </a:solidFill>
+                  <a:effectLst/>
+                  <a:uLnTx/>
+                  <a:uFillTx/>
+                  <a:latin typeface="Calibri" panose="020F0502020204030204"/>
+                  <a:ea typeface="+mn-ea"/>
+                  <a:cs typeface="+mn-cs"/>
+                </a:rPr>
+                <a:t>Resource  Layer Network (Kubernetes)</a:t>
+              </a:r>
+            </a:p>
+          </p:txBody>
+        </p:sp>
+        <p:sp>
+          <p:nvSpPr>
+            <p:cNvPr id="10" name="TextBox 9">
+              <a:extLst>
+                <a:ext uri="{FF2B5EF4-FFF2-40B4-BE49-F238E27FC236}">
+                  <a16:creationId xmlns:a16="http://schemas.microsoft.com/office/drawing/2014/main" id="{37BE3386-2CA8-48EB-A24C-05EBE5DCF0EF}"/>
+                </a:ext>
+              </a:extLst>
+            </p:cNvPr>
+            <p:cNvSpPr txBox="1"/>
+            <p:nvPr/>
+          </p:nvSpPr>
+          <p:spPr>
+            <a:xfrm>
+              <a:off x="1505814" y="3816049"/>
+              <a:ext cx="1569786" cy="646331"/>
+            </a:xfrm>
+            <a:prstGeom prst="rect">
+              <a:avLst/>
+            </a:prstGeom>
+            <a:noFill/>
+          </p:spPr>
+          <p:txBody>
+            <a:bodyPr wrap="square" rtlCol="0">
+              <a:spAutoFit/>
+            </a:bodyPr>
+            <a:lstStyle/>
+            <a:p>
+              <a:pPr marL="0" marR="0" lvl="0" indent="0" algn="ctr" defTabSz="914400" rtl="0" eaLnBrk="1" fontAlgn="auto" latinLnBrk="0" hangingPunct="1">
+                <a:lnSpc>
+                  <a:spcPct val="100000"/>
+                </a:lnSpc>
+                <a:spcBef>
+                  <a:spcPts val="0"/>
+                </a:spcBef>
+                <a:spcAft>
+                  <a:spcPts val="0"/>
+                </a:spcAft>
+                <a:buClrTx/>
+                <a:buSzTx/>
+                <a:buFontTx/>
+                <a:buNone/>
+                <a:tabLst/>
+                <a:defRPr/>
+              </a:pPr>
+              <a:r>
+                <a:rPr kumimoji="0" lang="en-GB" sz="1200" b="0" i="0" u="none" strike="noStrike" kern="1200" cap="none" spc="0" normalizeH="0" baseline="0" noProof="0" dirty="0">
+                  <a:ln>
+                    <a:noFill/>
+                  </a:ln>
+                  <a:solidFill>
+                    <a:prstClr val="black"/>
+                  </a:solidFill>
+                  <a:effectLst/>
+                  <a:uLnTx/>
+                  <a:uFillTx/>
+                  <a:latin typeface="Calibri" panose="020F0502020204030204"/>
+                  <a:ea typeface="+mn-ea"/>
+                  <a:cs typeface="+mn-cs"/>
+                </a:rPr>
+                <a:t>Resource Enablement Layer Network (5G Testbed)</a:t>
+              </a:r>
+            </a:p>
+          </p:txBody>
+        </p:sp>
+        <p:sp>
+          <p:nvSpPr>
+            <p:cNvPr id="12" name="Rectangle 11">
+              <a:extLst>
+                <a:ext uri="{FF2B5EF4-FFF2-40B4-BE49-F238E27FC236}">
+                  <a16:creationId xmlns:a16="http://schemas.microsoft.com/office/drawing/2014/main" id="{1BC8BF5E-59ED-452B-9EFA-856467B0D3F6}"/>
+                </a:ext>
+              </a:extLst>
+            </p:cNvPr>
+            <p:cNvSpPr/>
+            <p:nvPr/>
+          </p:nvSpPr>
+          <p:spPr>
+            <a:xfrm>
+              <a:off x="3445679" y="1805797"/>
+              <a:ext cx="690706" cy="309490"/>
+            </a:xfrm>
+            <a:prstGeom prst="rect">
+              <a:avLst/>
+            </a:prstGeom>
+            <a:solidFill>
+              <a:schemeClr val="accent5">
+                <a:lumMod val="20000"/>
+                <a:lumOff val="80000"/>
+              </a:schemeClr>
+            </a:solidFill>
+          </p:spPr>
+          <p:style>
+            <a:lnRef idx="2">
+              <a:schemeClr val="accent1">
+                <a:shade val="50000"/>
+              </a:schemeClr>
+            </a:lnRef>
+            <a:fillRef idx="1">
+              <a:schemeClr val="accent1"/>
+            </a:fillRef>
+            <a:effectRef idx="0">
+              <a:schemeClr val="accent1"/>
+            </a:effectRef>
+            <a:fontRef idx="minor">
+              <a:schemeClr val="lt1"/>
+            </a:fontRef>
+          </p:style>
+          <p:txBody>
+            <a:bodyPr rtlCol="0" anchor="ctr"/>
+            <a:lstStyle/>
+            <a:p>
+              <a:pPr marL="0" marR="0" lvl="0" indent="0" algn="ctr" defTabSz="914400" rtl="0" eaLnBrk="1" fontAlgn="auto" latinLnBrk="0" hangingPunct="1">
+                <a:lnSpc>
+                  <a:spcPct val="100000"/>
+                </a:lnSpc>
+                <a:spcBef>
+                  <a:spcPts val="0"/>
+                </a:spcBef>
+                <a:spcAft>
+                  <a:spcPts val="0"/>
+                </a:spcAft>
+                <a:buClrTx/>
+                <a:buSzTx/>
+                <a:buFontTx/>
+                <a:buNone/>
+                <a:tabLst/>
+                <a:defRPr/>
+              </a:pPr>
+              <a:r>
+                <a:rPr kumimoji="0" lang="en-GB" sz="1600" b="0" i="0" u="none" strike="noStrike" kern="1200" cap="none" spc="0" normalizeH="0" baseline="0" noProof="0" dirty="0">
+                  <a:ln>
+                    <a:noFill/>
+                  </a:ln>
+                  <a:solidFill>
+                    <a:srgbClr val="5B9BD5">
+                      <a:lumMod val="50000"/>
+                    </a:srgbClr>
+                  </a:solidFill>
+                  <a:effectLst/>
+                  <a:uLnTx/>
+                  <a:uFillTx/>
+                  <a:latin typeface="Calibri" panose="020F0502020204030204"/>
+                  <a:ea typeface="+mn-ea"/>
+                  <a:cs typeface="+mn-cs"/>
+                </a:rPr>
+                <a:t>Robot</a:t>
+              </a:r>
+              <a:endParaRPr kumimoji="0" lang="en-GB" sz="1800" b="0" i="0" u="none" strike="noStrike" kern="1200" cap="none" spc="0" normalizeH="0" baseline="0" noProof="0" dirty="0">
+                <a:ln>
+                  <a:noFill/>
+                </a:ln>
+                <a:solidFill>
+                  <a:srgbClr val="5B9BD5">
+                    <a:lumMod val="50000"/>
+                  </a:srgbClr>
+                </a:solidFill>
+                <a:effectLst/>
+                <a:uLnTx/>
+                <a:uFillTx/>
+                <a:latin typeface="Calibri" panose="020F0502020204030204"/>
+                <a:ea typeface="+mn-ea"/>
+                <a:cs typeface="+mn-cs"/>
+              </a:endParaRPr>
+            </a:p>
+          </p:txBody>
+        </p:sp>
+        <p:sp>
+          <p:nvSpPr>
+            <p:cNvPr id="13" name="Rectangle 12">
+              <a:extLst>
+                <a:ext uri="{FF2B5EF4-FFF2-40B4-BE49-F238E27FC236}">
+                  <a16:creationId xmlns:a16="http://schemas.microsoft.com/office/drawing/2014/main" id="{1AF00351-C5DD-4D5A-A375-F8B690E86B1E}"/>
+                </a:ext>
+              </a:extLst>
+            </p:cNvPr>
+            <p:cNvSpPr/>
+            <p:nvPr/>
+          </p:nvSpPr>
+          <p:spPr>
+            <a:xfrm>
+              <a:off x="7523197" y="1805795"/>
+              <a:ext cx="855534" cy="340891"/>
+            </a:xfrm>
+            <a:prstGeom prst="rect">
+              <a:avLst/>
+            </a:prstGeom>
+            <a:solidFill>
+              <a:schemeClr val="accent5">
+                <a:lumMod val="20000"/>
+                <a:lumOff val="80000"/>
+              </a:schemeClr>
+            </a:solidFill>
+          </p:spPr>
+          <p:style>
+            <a:lnRef idx="2">
+              <a:schemeClr val="accent1">
+                <a:shade val="50000"/>
+              </a:schemeClr>
+            </a:lnRef>
+            <a:fillRef idx="1">
+              <a:schemeClr val="accent1"/>
+            </a:fillRef>
+            <a:effectRef idx="0">
+              <a:schemeClr val="accent1"/>
+            </a:effectRef>
+            <a:fontRef idx="minor">
+              <a:schemeClr val="lt1"/>
+            </a:fontRef>
+          </p:style>
+          <p:txBody>
+            <a:bodyPr rtlCol="0" anchor="ctr"/>
+            <a:lstStyle/>
+            <a:p>
+              <a:pPr marL="0" marR="0" lvl="0" indent="0" algn="ctr" defTabSz="914400" rtl="0" eaLnBrk="1" fontAlgn="auto" latinLnBrk="0" hangingPunct="1">
+                <a:lnSpc>
+                  <a:spcPct val="100000"/>
+                </a:lnSpc>
+                <a:spcBef>
+                  <a:spcPts val="0"/>
+                </a:spcBef>
+                <a:spcAft>
+                  <a:spcPts val="0"/>
+                </a:spcAft>
+                <a:buClrTx/>
+                <a:buSzTx/>
+                <a:buFontTx/>
+                <a:buNone/>
+                <a:tabLst/>
+                <a:defRPr/>
+              </a:pPr>
+              <a:r>
+                <a:rPr kumimoji="0" lang="en-GB" sz="1200" b="0" i="0" u="none" strike="noStrike" kern="1200" cap="none" spc="0" normalizeH="0" baseline="0" noProof="0" dirty="0">
+                  <a:ln>
+                    <a:noFill/>
+                  </a:ln>
+                  <a:solidFill>
+                    <a:srgbClr val="5B9BD5">
+                      <a:lumMod val="50000"/>
+                    </a:srgbClr>
+                  </a:solidFill>
+                  <a:effectLst/>
+                  <a:uLnTx/>
+                  <a:uFillTx/>
+                  <a:latin typeface="Calibri" panose="020F0502020204030204"/>
+                  <a:ea typeface="+mn-ea"/>
+                  <a:cs typeface="+mn-cs"/>
+                </a:rPr>
+                <a:t>Detection Service</a:t>
+              </a:r>
+            </a:p>
+          </p:txBody>
+        </p:sp>
+        <p:sp>
+          <p:nvSpPr>
+            <p:cNvPr id="14" name="Rectangle 13">
+              <a:extLst>
+                <a:ext uri="{FF2B5EF4-FFF2-40B4-BE49-F238E27FC236}">
+                  <a16:creationId xmlns:a16="http://schemas.microsoft.com/office/drawing/2014/main" id="{ED057F7B-420D-41A5-95C2-8DDD34477A78}"/>
+                </a:ext>
+              </a:extLst>
+            </p:cNvPr>
+            <p:cNvSpPr/>
+            <p:nvPr/>
+          </p:nvSpPr>
+          <p:spPr>
+            <a:xfrm>
+              <a:off x="3404558" y="2720197"/>
+              <a:ext cx="731827" cy="309490"/>
+            </a:xfrm>
+            <a:prstGeom prst="rect">
+              <a:avLst/>
+            </a:prstGeom>
+            <a:solidFill>
+              <a:schemeClr val="accent5">
+                <a:lumMod val="20000"/>
+                <a:lumOff val="80000"/>
+              </a:schemeClr>
+            </a:solidFill>
+          </p:spPr>
+          <p:style>
+            <a:lnRef idx="2">
+              <a:schemeClr val="accent1">
+                <a:shade val="50000"/>
+              </a:schemeClr>
+            </a:lnRef>
+            <a:fillRef idx="1">
+              <a:schemeClr val="accent1"/>
+            </a:fillRef>
+            <a:effectRef idx="0">
+              <a:schemeClr val="accent1"/>
+            </a:effectRef>
+            <a:fontRef idx="minor">
+              <a:schemeClr val="lt1"/>
+            </a:fontRef>
+          </p:style>
+          <p:txBody>
+            <a:bodyPr rtlCol="0" anchor="ctr"/>
+            <a:lstStyle/>
+            <a:p>
+              <a:pPr marL="0" marR="0" lvl="0" indent="0" algn="ctr" defTabSz="914400" rtl="0" eaLnBrk="1" fontAlgn="auto" latinLnBrk="0" hangingPunct="1">
+                <a:lnSpc>
+                  <a:spcPct val="100000"/>
+                </a:lnSpc>
+                <a:spcBef>
+                  <a:spcPts val="0"/>
+                </a:spcBef>
+                <a:spcAft>
+                  <a:spcPts val="0"/>
+                </a:spcAft>
+                <a:buClrTx/>
+                <a:buSzTx/>
+                <a:buFontTx/>
+                <a:buNone/>
+                <a:tabLst/>
+                <a:defRPr/>
+              </a:pPr>
+              <a:r>
+                <a:rPr kumimoji="0" lang="en-GB" sz="1600" b="0" i="0" u="none" strike="noStrike" kern="1200" cap="none" spc="0" normalizeH="0" baseline="0" noProof="0" dirty="0">
+                  <a:ln>
+                    <a:noFill/>
+                  </a:ln>
+                  <a:solidFill>
+                    <a:srgbClr val="5B9BD5">
+                      <a:lumMod val="50000"/>
+                    </a:srgbClr>
+                  </a:solidFill>
+                  <a:effectLst/>
+                  <a:uLnTx/>
+                  <a:uFillTx/>
+                  <a:latin typeface="Calibri" panose="020F0502020204030204"/>
+                  <a:ea typeface="+mn-ea"/>
+                  <a:cs typeface="+mn-cs"/>
+                </a:rPr>
+                <a:t>Pod 1</a:t>
+              </a:r>
+              <a:endParaRPr kumimoji="0" lang="en-GB" sz="1800" b="0" i="0" u="none" strike="noStrike" kern="1200" cap="none" spc="0" normalizeH="0" baseline="0" noProof="0" dirty="0">
+                <a:ln>
+                  <a:noFill/>
+                </a:ln>
+                <a:solidFill>
+                  <a:srgbClr val="5B9BD5">
+                    <a:lumMod val="50000"/>
+                  </a:srgbClr>
+                </a:solidFill>
+                <a:effectLst/>
+                <a:uLnTx/>
+                <a:uFillTx/>
+                <a:latin typeface="Calibri" panose="020F0502020204030204"/>
+                <a:ea typeface="+mn-ea"/>
+                <a:cs typeface="+mn-cs"/>
+              </a:endParaRPr>
+            </a:p>
+          </p:txBody>
+        </p:sp>
+        <p:sp>
+          <p:nvSpPr>
+            <p:cNvPr id="15" name="Rectangle 14">
+              <a:extLst>
+                <a:ext uri="{FF2B5EF4-FFF2-40B4-BE49-F238E27FC236}">
+                  <a16:creationId xmlns:a16="http://schemas.microsoft.com/office/drawing/2014/main" id="{FEE413C8-2A1C-4671-A269-A28B92718398}"/>
+                </a:ext>
+              </a:extLst>
+            </p:cNvPr>
+            <p:cNvSpPr/>
+            <p:nvPr/>
+          </p:nvSpPr>
+          <p:spPr>
+            <a:xfrm>
+              <a:off x="7516747" y="2720195"/>
+              <a:ext cx="731827" cy="309490"/>
+            </a:xfrm>
+            <a:prstGeom prst="rect">
+              <a:avLst/>
+            </a:prstGeom>
+            <a:solidFill>
+              <a:schemeClr val="accent5">
+                <a:lumMod val="20000"/>
+                <a:lumOff val="80000"/>
+              </a:schemeClr>
+            </a:solidFill>
+          </p:spPr>
+          <p:style>
+            <a:lnRef idx="2">
+              <a:schemeClr val="accent1">
+                <a:shade val="50000"/>
+              </a:schemeClr>
+            </a:lnRef>
+            <a:fillRef idx="1">
+              <a:schemeClr val="accent1"/>
+            </a:fillRef>
+            <a:effectRef idx="0">
+              <a:schemeClr val="accent1"/>
+            </a:effectRef>
+            <a:fontRef idx="minor">
+              <a:schemeClr val="lt1"/>
+            </a:fontRef>
+          </p:style>
+          <p:txBody>
+            <a:bodyPr rtlCol="0" anchor="ctr"/>
+            <a:lstStyle/>
+            <a:p>
+              <a:pPr marL="0" marR="0" lvl="0" indent="0" algn="ctr" defTabSz="914400" rtl="0" eaLnBrk="1" fontAlgn="auto" latinLnBrk="0" hangingPunct="1">
+                <a:lnSpc>
+                  <a:spcPct val="100000"/>
+                </a:lnSpc>
+                <a:spcBef>
+                  <a:spcPts val="0"/>
+                </a:spcBef>
+                <a:spcAft>
+                  <a:spcPts val="0"/>
+                </a:spcAft>
+                <a:buClrTx/>
+                <a:buSzTx/>
+                <a:buFontTx/>
+                <a:buNone/>
+                <a:tabLst/>
+                <a:defRPr/>
+              </a:pPr>
+              <a:r>
+                <a:rPr kumimoji="0" lang="en-GB" sz="1600" b="0" i="0" u="none" strike="noStrike" kern="1200" cap="none" spc="0" normalizeH="0" baseline="0" noProof="0" dirty="0">
+                  <a:ln>
+                    <a:noFill/>
+                  </a:ln>
+                  <a:solidFill>
+                    <a:srgbClr val="5B9BD5">
+                      <a:lumMod val="50000"/>
+                    </a:srgbClr>
+                  </a:solidFill>
+                  <a:effectLst/>
+                  <a:uLnTx/>
+                  <a:uFillTx/>
+                  <a:latin typeface="Calibri" panose="020F0502020204030204"/>
+                  <a:ea typeface="+mn-ea"/>
+                  <a:cs typeface="+mn-cs"/>
+                </a:rPr>
+                <a:t>Pod 2</a:t>
+              </a:r>
+              <a:endParaRPr kumimoji="0" lang="en-GB" sz="1800" b="0" i="0" u="none" strike="noStrike" kern="1200" cap="none" spc="0" normalizeH="0" baseline="0" noProof="0" dirty="0">
+                <a:ln>
+                  <a:noFill/>
+                </a:ln>
+                <a:solidFill>
+                  <a:srgbClr val="5B9BD5">
+                    <a:lumMod val="50000"/>
+                  </a:srgbClr>
+                </a:solidFill>
+                <a:effectLst/>
+                <a:uLnTx/>
+                <a:uFillTx/>
+                <a:latin typeface="Calibri" panose="020F0502020204030204"/>
+                <a:ea typeface="+mn-ea"/>
+                <a:cs typeface="+mn-cs"/>
+              </a:endParaRPr>
+            </a:p>
+          </p:txBody>
+        </p:sp>
+        <p:sp>
+          <p:nvSpPr>
+            <p:cNvPr id="16" name="Rectangle 15">
+              <a:extLst>
+                <a:ext uri="{FF2B5EF4-FFF2-40B4-BE49-F238E27FC236}">
+                  <a16:creationId xmlns:a16="http://schemas.microsoft.com/office/drawing/2014/main" id="{C64F4D92-5ABA-4529-BDBA-D6BAEF8EFEE9}"/>
+                </a:ext>
+              </a:extLst>
+            </p:cNvPr>
+            <p:cNvSpPr/>
+            <p:nvPr/>
+          </p:nvSpPr>
+          <p:spPr>
+            <a:xfrm>
+              <a:off x="3439874" y="3634597"/>
+              <a:ext cx="684733" cy="309490"/>
+            </a:xfrm>
+            <a:prstGeom prst="rect">
+              <a:avLst/>
+            </a:prstGeom>
+            <a:solidFill>
+              <a:schemeClr val="accent5">
+                <a:lumMod val="20000"/>
+                <a:lumOff val="80000"/>
+              </a:schemeClr>
+            </a:solidFill>
+          </p:spPr>
+          <p:style>
+            <a:lnRef idx="2">
+              <a:schemeClr val="accent1">
+                <a:shade val="50000"/>
+              </a:schemeClr>
+            </a:lnRef>
+            <a:fillRef idx="1">
+              <a:schemeClr val="accent1"/>
+            </a:fillRef>
+            <a:effectRef idx="0">
+              <a:schemeClr val="accent1"/>
+            </a:effectRef>
+            <a:fontRef idx="minor">
+              <a:schemeClr val="lt1"/>
+            </a:fontRef>
+          </p:style>
+          <p:txBody>
+            <a:bodyPr rtlCol="0" anchor="ctr"/>
+            <a:lstStyle/>
+            <a:p>
+              <a:pPr marL="0" marR="0" lvl="0" indent="0" algn="ctr" defTabSz="914400" rtl="0" eaLnBrk="1" fontAlgn="auto" latinLnBrk="0" hangingPunct="1">
+                <a:lnSpc>
+                  <a:spcPct val="100000"/>
+                </a:lnSpc>
+                <a:spcBef>
+                  <a:spcPts val="0"/>
+                </a:spcBef>
+                <a:spcAft>
+                  <a:spcPts val="0"/>
+                </a:spcAft>
+                <a:buClrTx/>
+                <a:buSzTx/>
+                <a:buFontTx/>
+                <a:buNone/>
+                <a:tabLst/>
+                <a:defRPr/>
+              </a:pPr>
+              <a:r>
+                <a:rPr kumimoji="0" lang="en-GB" sz="1600" b="0" i="0" u="none" strike="noStrike" kern="1200" cap="none" spc="0" normalizeH="0" baseline="0" noProof="0" dirty="0">
+                  <a:ln>
+                    <a:noFill/>
+                  </a:ln>
+                  <a:solidFill>
+                    <a:srgbClr val="5B9BD5">
+                      <a:lumMod val="50000"/>
+                    </a:srgbClr>
+                  </a:solidFill>
+                  <a:effectLst/>
+                  <a:uLnTx/>
+                  <a:uFillTx/>
+                  <a:latin typeface="Calibri" panose="020F0502020204030204"/>
+                  <a:ea typeface="+mn-ea"/>
+                  <a:cs typeface="+mn-cs"/>
+                </a:rPr>
+                <a:t>Edge</a:t>
+              </a:r>
+              <a:endParaRPr kumimoji="0" lang="en-GB" sz="1800" b="0" i="0" u="none" strike="noStrike" kern="1200" cap="none" spc="0" normalizeH="0" baseline="0" noProof="0" dirty="0">
+                <a:ln>
+                  <a:noFill/>
+                </a:ln>
+                <a:solidFill>
+                  <a:srgbClr val="5B9BD5">
+                    <a:lumMod val="50000"/>
+                  </a:srgbClr>
+                </a:solidFill>
+                <a:effectLst/>
+                <a:uLnTx/>
+                <a:uFillTx/>
+                <a:latin typeface="Calibri" panose="020F0502020204030204"/>
+                <a:ea typeface="+mn-ea"/>
+                <a:cs typeface="+mn-cs"/>
+              </a:endParaRPr>
+            </a:p>
+          </p:txBody>
+        </p:sp>
+        <p:sp>
+          <p:nvSpPr>
+            <p:cNvPr id="17" name="Rectangle 16">
+              <a:extLst>
+                <a:ext uri="{FF2B5EF4-FFF2-40B4-BE49-F238E27FC236}">
+                  <a16:creationId xmlns:a16="http://schemas.microsoft.com/office/drawing/2014/main" id="{BC01DB7D-C054-4D01-A4B4-3FABB4966054}"/>
+                </a:ext>
+              </a:extLst>
+            </p:cNvPr>
+            <p:cNvSpPr/>
+            <p:nvPr/>
+          </p:nvSpPr>
+          <p:spPr>
+            <a:xfrm>
+              <a:off x="7536369" y="3634597"/>
+              <a:ext cx="684733" cy="309490"/>
+            </a:xfrm>
+            <a:prstGeom prst="rect">
+              <a:avLst/>
+            </a:prstGeom>
+            <a:solidFill>
+              <a:schemeClr val="accent5">
+                <a:lumMod val="20000"/>
+                <a:lumOff val="80000"/>
+              </a:schemeClr>
+            </a:solidFill>
+          </p:spPr>
+          <p:style>
+            <a:lnRef idx="2">
+              <a:schemeClr val="accent1">
+                <a:shade val="50000"/>
+              </a:schemeClr>
+            </a:lnRef>
+            <a:fillRef idx="1">
+              <a:schemeClr val="accent1"/>
+            </a:fillRef>
+            <a:effectRef idx="0">
+              <a:schemeClr val="accent1"/>
+            </a:effectRef>
+            <a:fontRef idx="minor">
+              <a:schemeClr val="lt1"/>
+            </a:fontRef>
+          </p:style>
+          <p:txBody>
+            <a:bodyPr rtlCol="0" anchor="ctr"/>
+            <a:lstStyle/>
+            <a:p>
+              <a:pPr marL="0" marR="0" lvl="0" indent="0" algn="ctr" defTabSz="914400" rtl="0" eaLnBrk="1" fontAlgn="auto" latinLnBrk="0" hangingPunct="1">
+                <a:lnSpc>
+                  <a:spcPct val="100000"/>
+                </a:lnSpc>
+                <a:spcBef>
+                  <a:spcPts val="0"/>
+                </a:spcBef>
+                <a:spcAft>
+                  <a:spcPts val="0"/>
+                </a:spcAft>
+                <a:buClrTx/>
+                <a:buSzTx/>
+                <a:buFontTx/>
+                <a:buNone/>
+                <a:tabLst/>
+                <a:defRPr/>
+              </a:pPr>
+              <a:r>
+                <a:rPr kumimoji="0" lang="en-GB" sz="1600" b="0" i="0" u="none" strike="noStrike" kern="1200" cap="none" spc="0" normalizeH="0" baseline="0" noProof="0" dirty="0">
+                  <a:ln>
+                    <a:noFill/>
+                  </a:ln>
+                  <a:solidFill>
+                    <a:srgbClr val="5B9BD5">
+                      <a:lumMod val="50000"/>
+                    </a:srgbClr>
+                  </a:solidFill>
+                  <a:effectLst/>
+                  <a:uLnTx/>
+                  <a:uFillTx/>
+                  <a:latin typeface="Calibri" panose="020F0502020204030204"/>
+                  <a:ea typeface="+mn-ea"/>
+                  <a:cs typeface="+mn-cs"/>
+                </a:rPr>
+                <a:t>Cloud</a:t>
+              </a:r>
+              <a:endParaRPr kumimoji="0" lang="en-GB" sz="1800" b="0" i="0" u="none" strike="noStrike" kern="1200" cap="none" spc="0" normalizeH="0" baseline="0" noProof="0" dirty="0">
+                <a:ln>
+                  <a:noFill/>
+                </a:ln>
+                <a:solidFill>
+                  <a:srgbClr val="5B9BD5">
+                    <a:lumMod val="50000"/>
+                  </a:srgbClr>
+                </a:solidFill>
+                <a:effectLst/>
+                <a:uLnTx/>
+                <a:uFillTx/>
+                <a:latin typeface="Calibri" panose="020F0502020204030204"/>
+                <a:ea typeface="+mn-ea"/>
+                <a:cs typeface="+mn-cs"/>
+              </a:endParaRPr>
+            </a:p>
+          </p:txBody>
+        </p:sp>
+        <p:sp>
+          <p:nvSpPr>
+            <p:cNvPr id="19" name="Rectangle 18">
+              <a:extLst>
+                <a:ext uri="{FF2B5EF4-FFF2-40B4-BE49-F238E27FC236}">
+                  <a16:creationId xmlns:a16="http://schemas.microsoft.com/office/drawing/2014/main" id="{B56E0676-AB73-4E6B-A482-F1CFA6AE2415}"/>
+                </a:ext>
+              </a:extLst>
+            </p:cNvPr>
+            <p:cNvSpPr/>
+            <p:nvPr/>
+          </p:nvSpPr>
+          <p:spPr>
+            <a:xfrm>
+              <a:off x="4770469" y="1805795"/>
+              <a:ext cx="690706" cy="309490"/>
+            </a:xfrm>
+            <a:prstGeom prst="rect">
+              <a:avLst/>
+            </a:prstGeom>
+            <a:solidFill>
+              <a:schemeClr val="accent5">
+                <a:lumMod val="20000"/>
+                <a:lumOff val="80000"/>
+              </a:schemeClr>
+            </a:solidFill>
+          </p:spPr>
+          <p:style>
+            <a:lnRef idx="2">
+              <a:schemeClr val="accent1">
+                <a:shade val="50000"/>
+              </a:schemeClr>
+            </a:lnRef>
+            <a:fillRef idx="1">
+              <a:schemeClr val="accent1"/>
+            </a:fillRef>
+            <a:effectRef idx="0">
+              <a:schemeClr val="accent1"/>
+            </a:effectRef>
+            <a:fontRef idx="minor">
+              <a:schemeClr val="lt1"/>
+            </a:fontRef>
+          </p:style>
+          <p:txBody>
+            <a:bodyPr rtlCol="0" anchor="ctr"/>
+            <a:lstStyle/>
+            <a:p>
+              <a:pPr marL="0" marR="0" lvl="0" indent="0" algn="ctr" defTabSz="914400" rtl="0" eaLnBrk="1" fontAlgn="auto" latinLnBrk="0" hangingPunct="1">
+                <a:lnSpc>
+                  <a:spcPct val="100000"/>
+                </a:lnSpc>
+                <a:spcBef>
+                  <a:spcPts val="0"/>
+                </a:spcBef>
+                <a:spcAft>
+                  <a:spcPts val="0"/>
+                </a:spcAft>
+                <a:buClrTx/>
+                <a:buSzTx/>
+                <a:buFontTx/>
+                <a:buNone/>
+                <a:tabLst/>
+                <a:defRPr/>
+              </a:pPr>
+              <a:r>
+                <a:rPr kumimoji="0" lang="en-GB" sz="1600" b="0" i="0" u="none" strike="noStrike" kern="1200" cap="none" spc="0" normalizeH="0" baseline="0" noProof="0" dirty="0">
+                  <a:ln>
+                    <a:noFill/>
+                  </a:ln>
+                  <a:solidFill>
+                    <a:srgbClr val="5B9BD5">
+                      <a:lumMod val="50000"/>
+                    </a:srgbClr>
+                  </a:solidFill>
+                  <a:effectLst/>
+                  <a:uLnTx/>
+                  <a:uFillTx/>
+                  <a:latin typeface="Calibri" panose="020F0502020204030204"/>
+                  <a:ea typeface="+mn-ea"/>
+                  <a:cs typeface="+mn-cs"/>
+                </a:rPr>
+                <a:t>DDS</a:t>
+              </a:r>
+              <a:endParaRPr kumimoji="0" lang="en-GB" sz="1800" b="0" i="0" u="none" strike="noStrike" kern="1200" cap="none" spc="0" normalizeH="0" baseline="0" noProof="0" dirty="0">
+                <a:ln>
+                  <a:noFill/>
+                </a:ln>
+                <a:solidFill>
+                  <a:srgbClr val="5B9BD5">
+                    <a:lumMod val="50000"/>
+                  </a:srgbClr>
+                </a:solidFill>
+                <a:effectLst/>
+                <a:uLnTx/>
+                <a:uFillTx/>
+                <a:latin typeface="Calibri" panose="020F0502020204030204"/>
+                <a:ea typeface="+mn-ea"/>
+                <a:cs typeface="+mn-cs"/>
+              </a:endParaRPr>
+            </a:p>
+          </p:txBody>
+        </p:sp>
+        <p:cxnSp>
+          <p:nvCxnSpPr>
+            <p:cNvPr id="21" name="Straight Connector 20">
+              <a:extLst>
+                <a:ext uri="{FF2B5EF4-FFF2-40B4-BE49-F238E27FC236}">
+                  <a16:creationId xmlns:a16="http://schemas.microsoft.com/office/drawing/2014/main" id="{003C1E27-1BA0-4EAB-AA6D-9F992380DC32}"/>
+                </a:ext>
+              </a:extLst>
+            </p:cNvPr>
+            <p:cNvCxnSpPr>
+              <a:endCxn id="19" idx="1"/>
+            </p:cNvCxnSpPr>
+            <p:nvPr/>
+          </p:nvCxnSpPr>
+          <p:spPr>
+            <a:xfrm>
+              <a:off x="4136385" y="1960540"/>
+              <a:ext cx="634084" cy="0"/>
+            </a:xfrm>
+            <a:prstGeom prst="line">
+              <a:avLst/>
+            </a:prstGeom>
+          </p:spPr>
+          <p:style>
+            <a:lnRef idx="1">
+              <a:schemeClr val="dk1"/>
+            </a:lnRef>
+            <a:fillRef idx="0">
+              <a:schemeClr val="dk1"/>
+            </a:fillRef>
+            <a:effectRef idx="0">
+              <a:schemeClr val="dk1"/>
+            </a:effectRef>
+            <a:fontRef idx="minor">
+              <a:schemeClr val="tx1"/>
+            </a:fontRef>
+          </p:style>
+        </p:cxnSp>
+        <p:cxnSp>
+          <p:nvCxnSpPr>
+            <p:cNvPr id="23" name="Straight Connector 22">
+              <a:extLst>
+                <a:ext uri="{FF2B5EF4-FFF2-40B4-BE49-F238E27FC236}">
+                  <a16:creationId xmlns:a16="http://schemas.microsoft.com/office/drawing/2014/main" id="{AB838B77-7B55-4E52-8130-D3AA5F7A7BA8}"/>
+                </a:ext>
+              </a:extLst>
+            </p:cNvPr>
+            <p:cNvCxnSpPr>
+              <a:cxnSpLocks/>
+            </p:cNvCxnSpPr>
+            <p:nvPr/>
+          </p:nvCxnSpPr>
+          <p:spPr>
+            <a:xfrm>
+              <a:off x="5473972" y="1960540"/>
+              <a:ext cx="2049225" cy="0"/>
+            </a:xfrm>
+            <a:prstGeom prst="line">
+              <a:avLst/>
+            </a:prstGeom>
+          </p:spPr>
+          <p:style>
+            <a:lnRef idx="1">
+              <a:schemeClr val="dk1"/>
+            </a:lnRef>
+            <a:fillRef idx="0">
+              <a:schemeClr val="dk1"/>
+            </a:fillRef>
+            <a:effectRef idx="0">
+              <a:schemeClr val="dk1"/>
+            </a:effectRef>
+            <a:fontRef idx="minor">
+              <a:schemeClr val="tx1"/>
+            </a:fontRef>
+          </p:style>
+        </p:cxnSp>
+        <p:sp>
+          <p:nvSpPr>
+            <p:cNvPr id="28" name="Rectangle 27">
+              <a:extLst>
+                <a:ext uri="{FF2B5EF4-FFF2-40B4-BE49-F238E27FC236}">
+                  <a16:creationId xmlns:a16="http://schemas.microsoft.com/office/drawing/2014/main" id="{A33235BB-8FD8-494F-836F-754626818052}"/>
+                </a:ext>
+              </a:extLst>
+            </p:cNvPr>
+            <p:cNvSpPr/>
+            <p:nvPr/>
+          </p:nvSpPr>
+          <p:spPr>
+            <a:xfrm>
+              <a:off x="4770469" y="2719318"/>
+              <a:ext cx="690706" cy="309490"/>
+            </a:xfrm>
+            <a:prstGeom prst="rect">
+              <a:avLst/>
+            </a:prstGeom>
+            <a:solidFill>
+              <a:schemeClr val="accent5">
+                <a:lumMod val="20000"/>
+                <a:lumOff val="80000"/>
+              </a:schemeClr>
+            </a:solidFill>
+          </p:spPr>
+          <p:style>
+            <a:lnRef idx="2">
+              <a:schemeClr val="accent1">
+                <a:shade val="50000"/>
+              </a:schemeClr>
+            </a:lnRef>
+            <a:fillRef idx="1">
+              <a:schemeClr val="accent1"/>
+            </a:fillRef>
+            <a:effectRef idx="0">
+              <a:schemeClr val="accent1"/>
+            </a:effectRef>
+            <a:fontRef idx="minor">
+              <a:schemeClr val="lt1"/>
+            </a:fontRef>
+          </p:style>
+          <p:txBody>
+            <a:bodyPr rtlCol="0" anchor="ctr"/>
+            <a:lstStyle/>
+            <a:p>
+              <a:pPr marL="0" marR="0" lvl="0" indent="0" algn="ctr" defTabSz="914400" rtl="0" eaLnBrk="1" fontAlgn="auto" latinLnBrk="0" hangingPunct="1">
+                <a:lnSpc>
+                  <a:spcPct val="100000"/>
+                </a:lnSpc>
+                <a:spcBef>
+                  <a:spcPts val="0"/>
+                </a:spcBef>
+                <a:spcAft>
+                  <a:spcPts val="0"/>
+                </a:spcAft>
+                <a:buClrTx/>
+                <a:buSzTx/>
+                <a:buFontTx/>
+                <a:buNone/>
+                <a:tabLst/>
+                <a:defRPr/>
+              </a:pPr>
+              <a:r>
+                <a:rPr kumimoji="0" lang="en-GB" sz="1600" b="0" i="0" u="none" strike="noStrike" kern="1200" cap="none" spc="0" normalizeH="0" baseline="0" noProof="0" dirty="0">
+                  <a:ln>
+                    <a:noFill/>
+                  </a:ln>
+                  <a:solidFill>
+                    <a:srgbClr val="5B9BD5">
+                      <a:lumMod val="50000"/>
+                    </a:srgbClr>
+                  </a:solidFill>
+                  <a:effectLst/>
+                  <a:uLnTx/>
+                  <a:uFillTx/>
+                  <a:latin typeface="Calibri" panose="020F0502020204030204"/>
+                  <a:ea typeface="+mn-ea"/>
+                  <a:cs typeface="+mn-cs"/>
+                </a:rPr>
+                <a:t>VPN</a:t>
+              </a:r>
+              <a:endParaRPr kumimoji="0" lang="en-GB" sz="1800" b="0" i="0" u="none" strike="noStrike" kern="1200" cap="none" spc="0" normalizeH="0" baseline="0" noProof="0" dirty="0">
+                <a:ln>
+                  <a:noFill/>
+                </a:ln>
+                <a:solidFill>
+                  <a:srgbClr val="5B9BD5">
+                    <a:lumMod val="50000"/>
+                  </a:srgbClr>
+                </a:solidFill>
+                <a:effectLst/>
+                <a:uLnTx/>
+                <a:uFillTx/>
+                <a:latin typeface="Calibri" panose="020F0502020204030204"/>
+                <a:ea typeface="+mn-ea"/>
+                <a:cs typeface="+mn-cs"/>
+              </a:endParaRPr>
+            </a:p>
+          </p:txBody>
+        </p:sp>
+        <p:cxnSp>
+          <p:nvCxnSpPr>
+            <p:cNvPr id="29" name="Straight Connector 28">
+              <a:extLst>
+                <a:ext uri="{FF2B5EF4-FFF2-40B4-BE49-F238E27FC236}">
+                  <a16:creationId xmlns:a16="http://schemas.microsoft.com/office/drawing/2014/main" id="{7C488A55-C19A-40E0-8A08-BB879A424A4C}"/>
+                </a:ext>
+              </a:extLst>
+            </p:cNvPr>
+            <p:cNvCxnSpPr/>
+            <p:nvPr/>
+          </p:nvCxnSpPr>
+          <p:spPr>
+            <a:xfrm>
+              <a:off x="4136385" y="2874063"/>
+              <a:ext cx="634084" cy="0"/>
+            </a:xfrm>
+            <a:prstGeom prst="line">
+              <a:avLst/>
+            </a:prstGeom>
+          </p:spPr>
+          <p:style>
+            <a:lnRef idx="1">
+              <a:schemeClr val="dk1"/>
+            </a:lnRef>
+            <a:fillRef idx="0">
+              <a:schemeClr val="dk1"/>
+            </a:fillRef>
+            <a:effectRef idx="0">
+              <a:schemeClr val="dk1"/>
+            </a:effectRef>
+            <a:fontRef idx="minor">
+              <a:schemeClr val="tx1"/>
+            </a:fontRef>
+          </p:style>
+        </p:cxnSp>
+        <p:cxnSp>
+          <p:nvCxnSpPr>
+            <p:cNvPr id="30" name="Straight Connector 29">
+              <a:extLst>
+                <a:ext uri="{FF2B5EF4-FFF2-40B4-BE49-F238E27FC236}">
+                  <a16:creationId xmlns:a16="http://schemas.microsoft.com/office/drawing/2014/main" id="{9D042057-5EFD-42E6-A677-2B1594090A3E}"/>
+                </a:ext>
+              </a:extLst>
+            </p:cNvPr>
+            <p:cNvCxnSpPr>
+              <a:cxnSpLocks/>
+            </p:cNvCxnSpPr>
+            <p:nvPr/>
+          </p:nvCxnSpPr>
+          <p:spPr>
+            <a:xfrm>
+              <a:off x="5461175" y="2862507"/>
+              <a:ext cx="2049225" cy="0"/>
+            </a:xfrm>
+            <a:prstGeom prst="line">
+              <a:avLst/>
+            </a:prstGeom>
+          </p:spPr>
+          <p:style>
+            <a:lnRef idx="1">
+              <a:schemeClr val="dk1"/>
+            </a:lnRef>
+            <a:fillRef idx="0">
+              <a:schemeClr val="dk1"/>
+            </a:fillRef>
+            <a:effectRef idx="0">
+              <a:schemeClr val="dk1"/>
+            </a:effectRef>
+            <a:fontRef idx="minor">
+              <a:schemeClr val="tx1"/>
+            </a:fontRef>
+          </p:style>
+        </p:cxnSp>
+        <p:sp>
+          <p:nvSpPr>
+            <p:cNvPr id="31" name="Rectangle 30">
+              <a:extLst>
+                <a:ext uri="{FF2B5EF4-FFF2-40B4-BE49-F238E27FC236}">
+                  <a16:creationId xmlns:a16="http://schemas.microsoft.com/office/drawing/2014/main" id="{4DA1DF46-A720-4CE2-A515-B0291AC95307}"/>
+                </a:ext>
+              </a:extLst>
+            </p:cNvPr>
+            <p:cNvSpPr/>
+            <p:nvPr/>
+          </p:nvSpPr>
+          <p:spPr>
+            <a:xfrm>
+              <a:off x="4781481" y="3632905"/>
+              <a:ext cx="690706" cy="309490"/>
+            </a:xfrm>
+            <a:prstGeom prst="rect">
+              <a:avLst/>
+            </a:prstGeom>
+            <a:solidFill>
+              <a:schemeClr val="accent5">
+                <a:lumMod val="20000"/>
+                <a:lumOff val="80000"/>
+              </a:schemeClr>
+            </a:solidFill>
+          </p:spPr>
+          <p:style>
+            <a:lnRef idx="2">
+              <a:schemeClr val="accent1">
+                <a:shade val="50000"/>
+              </a:schemeClr>
+            </a:lnRef>
+            <a:fillRef idx="1">
+              <a:schemeClr val="accent1"/>
+            </a:fillRef>
+            <a:effectRef idx="0">
+              <a:schemeClr val="accent1"/>
+            </a:effectRef>
+            <a:fontRef idx="minor">
+              <a:schemeClr val="lt1"/>
+            </a:fontRef>
+          </p:style>
+          <p:txBody>
+            <a:bodyPr rtlCol="0" anchor="ctr"/>
+            <a:lstStyle/>
+            <a:p>
+              <a:pPr marL="0" marR="0" lvl="0" indent="0" algn="ctr" defTabSz="914400" rtl="0" eaLnBrk="1" fontAlgn="auto" latinLnBrk="0" hangingPunct="1">
+                <a:lnSpc>
+                  <a:spcPct val="100000"/>
+                </a:lnSpc>
+                <a:spcBef>
+                  <a:spcPts val="0"/>
+                </a:spcBef>
+                <a:spcAft>
+                  <a:spcPts val="0"/>
+                </a:spcAft>
+                <a:buClrTx/>
+                <a:buSzTx/>
+                <a:buFontTx/>
+                <a:buNone/>
+                <a:tabLst/>
+                <a:defRPr/>
+              </a:pPr>
+              <a:r>
+                <a:rPr kumimoji="0" lang="en-GB" sz="1600" b="0" i="0" u="none" strike="noStrike" kern="1200" cap="none" spc="0" normalizeH="0" baseline="0" noProof="0" dirty="0">
+                  <a:ln>
+                    <a:noFill/>
+                  </a:ln>
+                  <a:solidFill>
+                    <a:srgbClr val="5B9BD5">
+                      <a:lumMod val="50000"/>
+                    </a:srgbClr>
+                  </a:solidFill>
+                  <a:effectLst/>
+                  <a:uLnTx/>
+                  <a:uFillTx/>
+                  <a:latin typeface="Calibri" panose="020F0502020204030204"/>
+                  <a:ea typeface="+mn-ea"/>
+                  <a:cs typeface="+mn-cs"/>
+                </a:rPr>
+                <a:t>Slices</a:t>
+              </a:r>
+              <a:endParaRPr kumimoji="0" lang="en-GB" sz="1800" b="0" i="0" u="none" strike="noStrike" kern="1200" cap="none" spc="0" normalizeH="0" baseline="0" noProof="0" dirty="0">
+                <a:ln>
+                  <a:noFill/>
+                </a:ln>
+                <a:solidFill>
+                  <a:srgbClr val="5B9BD5">
+                    <a:lumMod val="50000"/>
+                  </a:srgbClr>
+                </a:solidFill>
+                <a:effectLst/>
+                <a:uLnTx/>
+                <a:uFillTx/>
+                <a:latin typeface="Calibri" panose="020F0502020204030204"/>
+                <a:ea typeface="+mn-ea"/>
+                <a:cs typeface="+mn-cs"/>
+              </a:endParaRPr>
+            </a:p>
+          </p:txBody>
+        </p:sp>
+        <p:cxnSp>
+          <p:nvCxnSpPr>
+            <p:cNvPr id="32" name="Straight Connector 31">
+              <a:extLst>
+                <a:ext uri="{FF2B5EF4-FFF2-40B4-BE49-F238E27FC236}">
+                  <a16:creationId xmlns:a16="http://schemas.microsoft.com/office/drawing/2014/main" id="{2C7BCC21-FE64-49E7-9D98-19933E886C06}"/>
+                </a:ext>
+              </a:extLst>
+            </p:cNvPr>
+            <p:cNvCxnSpPr/>
+            <p:nvPr/>
+          </p:nvCxnSpPr>
+          <p:spPr>
+            <a:xfrm>
+              <a:off x="4132455" y="3788352"/>
+              <a:ext cx="634084" cy="0"/>
+            </a:xfrm>
+            <a:prstGeom prst="line">
+              <a:avLst/>
+            </a:prstGeom>
+          </p:spPr>
+          <p:style>
+            <a:lnRef idx="1">
+              <a:schemeClr val="dk1"/>
+            </a:lnRef>
+            <a:fillRef idx="0">
+              <a:schemeClr val="dk1"/>
+            </a:fillRef>
+            <a:effectRef idx="0">
+              <a:schemeClr val="dk1"/>
+            </a:effectRef>
+            <a:fontRef idx="minor">
+              <a:schemeClr val="tx1"/>
+            </a:fontRef>
+          </p:style>
+        </p:cxnSp>
+        <p:cxnSp>
+          <p:nvCxnSpPr>
+            <p:cNvPr id="33" name="Straight Connector 32">
+              <a:extLst>
+                <a:ext uri="{FF2B5EF4-FFF2-40B4-BE49-F238E27FC236}">
+                  <a16:creationId xmlns:a16="http://schemas.microsoft.com/office/drawing/2014/main" id="{0CC94B04-28CB-4E67-82CC-5D8EF8E55700}"/>
+                </a:ext>
+              </a:extLst>
+            </p:cNvPr>
+            <p:cNvCxnSpPr>
+              <a:cxnSpLocks/>
+            </p:cNvCxnSpPr>
+            <p:nvPr/>
+          </p:nvCxnSpPr>
+          <p:spPr>
+            <a:xfrm>
+              <a:off x="5472187" y="3776796"/>
+              <a:ext cx="2049225" cy="0"/>
+            </a:xfrm>
+            <a:prstGeom prst="line">
+              <a:avLst/>
+            </a:prstGeom>
+          </p:spPr>
+          <p:style>
+            <a:lnRef idx="1">
+              <a:schemeClr val="dk1"/>
+            </a:lnRef>
+            <a:fillRef idx="0">
+              <a:schemeClr val="dk1"/>
+            </a:fillRef>
+            <a:effectRef idx="0">
+              <a:schemeClr val="dk1"/>
+            </a:effectRef>
+            <a:fontRef idx="minor">
+              <a:schemeClr val="tx1"/>
+            </a:fontRef>
+          </p:style>
+        </p:cxnSp>
+        <p:sp>
+          <p:nvSpPr>
+            <p:cNvPr id="11" name="Rectangle 10">
+              <a:extLst>
+                <a:ext uri="{FF2B5EF4-FFF2-40B4-BE49-F238E27FC236}">
+                  <a16:creationId xmlns:a16="http://schemas.microsoft.com/office/drawing/2014/main" id="{73130245-D429-4C5E-A555-F127D2841DBC}"/>
+                </a:ext>
+              </a:extLst>
+            </p:cNvPr>
+            <p:cNvSpPr/>
+            <p:nvPr/>
+          </p:nvSpPr>
+          <p:spPr>
+            <a:xfrm>
+              <a:off x="5689903" y="2550358"/>
+              <a:ext cx="1244055" cy="1346091"/>
+            </a:xfrm>
+            <a:prstGeom prst="rect">
+              <a:avLst/>
+            </a:prstGeom>
+            <a:solidFill>
+              <a:schemeClr val="accent1">
+                <a:lumMod val="75000"/>
+              </a:schemeClr>
+            </a:solidFill>
+          </p:spPr>
+          <p:style>
+            <a:lnRef idx="2">
+              <a:schemeClr val="accent6">
+                <a:shade val="50000"/>
+              </a:schemeClr>
+            </a:lnRef>
+            <a:fillRef idx="1">
+              <a:schemeClr val="accent6"/>
+            </a:fillRef>
+            <a:effectRef idx="0">
+              <a:schemeClr val="accent6"/>
+            </a:effectRef>
+            <a:fontRef idx="minor">
+              <a:schemeClr val="lt1"/>
+            </a:fontRef>
+          </p:style>
+          <p:txBody>
+            <a:bodyPr rtlCol="0" anchor="ctr"/>
+            <a:lstStyle/>
+            <a:p>
+              <a:pPr marL="0" marR="0" lvl="0" indent="0" algn="ctr" defTabSz="914400" rtl="0" eaLnBrk="1" fontAlgn="auto" latinLnBrk="0" hangingPunct="1">
+                <a:lnSpc>
+                  <a:spcPct val="100000"/>
+                </a:lnSpc>
+                <a:spcBef>
+                  <a:spcPts val="0"/>
+                </a:spcBef>
+                <a:spcAft>
+                  <a:spcPts val="0"/>
+                </a:spcAft>
+                <a:buClrTx/>
+                <a:buSzTx/>
+                <a:buFontTx/>
+                <a:buNone/>
+                <a:tabLst/>
+                <a:defRPr/>
+              </a:pPr>
+              <a:r>
+                <a:rPr kumimoji="0" lang="en-GB" sz="1800" b="0" i="0" u="none" strike="noStrike" kern="1200" cap="none" spc="0" normalizeH="0" baseline="0" noProof="0" dirty="0">
+                  <a:ln>
+                    <a:noFill/>
+                  </a:ln>
+                  <a:solidFill>
+                    <a:prstClr val="white"/>
+                  </a:solidFill>
+                  <a:effectLst/>
+                  <a:uLnTx/>
+                  <a:uFillTx/>
+                  <a:latin typeface="Calibri" panose="020F0502020204030204"/>
+                  <a:ea typeface="+mn-ea"/>
+                  <a:cs typeface="+mn-cs"/>
+                </a:rPr>
+                <a:t>MW</a:t>
+              </a:r>
+            </a:p>
+          </p:txBody>
+        </p:sp>
+      </p:grpSp>
+    </p:spTree>
+    <p:extLst>
+      <p:ext uri="{BB962C8B-B14F-4D97-AF65-F5344CB8AC3E}">
+        <p14:creationId xmlns:p14="http://schemas.microsoft.com/office/powerpoint/2010/main" val="2759381901"/>
+      </p:ext>
+    </p:extLst>
+  </p:cSld>
+  <p:clrMapOvr>
+    <a:masterClrMapping/>
+  </p:clrMapOvr>
+</p:sld>
+</file>
+
 <file path=ppt/theme/theme1.xml><?xml version="1.0" encoding="utf-8"?>
 <a:theme xmlns:a="http://schemas.openxmlformats.org/drawingml/2006/main" name="Office Theme">
   <a:themeElements>

</xml_diff>